<commit_message>
Update webpage to have dropdown and handle multiple options
</commit_message>
<xml_diff>
--- a/FlaskApp/generated/Company51LearnByDept2022-06-14.pptx
+++ b/FlaskApp/generated/Company51LearnByDept2022-06-14.pptx
@@ -3407,67 +3407,7 @@
                     <a:lstStyle/>
                     <a:p>
                       <a:r>
-                        <a:t>Krsg</a:t>
-                      </a:r>
-                    </a:p>
-                  </a:txBody>
-                  <a:tcPr/>
-                </a:tc>
-                <a:tc>
-                  <a:txBody>
-                    <a:bodyPr/>
-                    <a:lstStyle/>
-                    <a:p>
-                      <a:r>
-                        <a:t>0</a:t>
-                      </a:r>
-                    </a:p>
-                  </a:txBody>
-                  <a:tcPr/>
-                </a:tc>
-                <a:tc>
-                  <a:txBody>
-                    <a:bodyPr/>
-                    <a:lstStyle/>
-                    <a:p>
-                      <a:r>
-                        <a:t>0</a:t>
-                      </a:r>
-                    </a:p>
-                  </a:txBody>
-                  <a:tcPr/>
-                </a:tc>
-                <a:tc>
-                  <a:txBody>
-                    <a:bodyPr/>
-                    <a:lstStyle/>
-                    <a:p>
-                      <a:r>
-                        <a:t>0</a:t>
-                      </a:r>
-                    </a:p>
-                  </a:txBody>
-                  <a:tcPr/>
-                </a:tc>
-                <a:tc>
-                  <a:txBody>
-                    <a:bodyPr/>
-                    <a:lstStyle/>
-                    <a:p>
-                      <a:r>
-                        <a:t>0</a:t>
-                      </a:r>
-                    </a:p>
-                  </a:txBody>
-                  <a:tcPr/>
-                </a:tc>
-                <a:tc>
-                  <a:txBody>
-                    <a:bodyPr/>
-                    <a:lstStyle/>
-                    <a:p>
-                      <a:r>
-                        <a:t>0</a:t>
+                        <a:t>Arcolab</a:t>
                       </a:r>
                     </a:p>
                   </a:txBody>
@@ -3611,19 +3551,79 @@
                     <a:lstStyle/>
                     <a:p>
                       <a:r>
-                        <a:t>1041</a:t>
-                      </a:r>
-                    </a:p>
-                  </a:txBody>
-                  <a:tcPr/>
-                </a:tc>
-                <a:tc>
-                  <a:txBody>
-                    <a:bodyPr/>
-                    <a:lstStyle/>
-                    <a:p>
-                      <a:r>
-                        <a:t>1042</a:t>
+                        <a:t>0</a:t>
+                      </a:r>
+                    </a:p>
+                  </a:txBody>
+                  <a:tcPr/>
+                </a:tc>
+                <a:tc>
+                  <a:txBody>
+                    <a:bodyPr/>
+                    <a:lstStyle/>
+                    <a:p>
+                      <a:r>
+                        <a:t>0</a:t>
+                      </a:r>
+                    </a:p>
+                  </a:txBody>
+                  <a:tcPr/>
+                </a:tc>
+                <a:tc>
+                  <a:txBody>
+                    <a:bodyPr/>
+                    <a:lstStyle/>
+                    <a:p>
+                      <a:r>
+                        <a:t>0</a:t>
+                      </a:r>
+                    </a:p>
+                  </a:txBody>
+                  <a:tcPr/>
+                </a:tc>
+                <a:tc>
+                  <a:txBody>
+                    <a:bodyPr/>
+                    <a:lstStyle/>
+                    <a:p>
+                      <a:r>
+                        <a:t>0</a:t>
+                      </a:r>
+                    </a:p>
+                  </a:txBody>
+                  <a:tcPr/>
+                </a:tc>
+                <a:tc>
+                  <a:txBody>
+                    <a:bodyPr/>
+                    <a:lstStyle/>
+                    <a:p>
+                      <a:r>
+                        <a:t>0</a:t>
+                      </a:r>
+                    </a:p>
+                  </a:txBody>
+                  <a:tcPr/>
+                </a:tc>
+                <a:tc>
+                  <a:txBody>
+                    <a:bodyPr/>
+                    <a:lstStyle/>
+                    <a:p>
+                      <a:r>
+                        <a:t>171</a:t>
+                      </a:r>
+                    </a:p>
+                  </a:txBody>
+                  <a:tcPr/>
+                </a:tc>
+                <a:tc>
+                  <a:txBody>
+                    <a:bodyPr/>
+                    <a:lstStyle/>
+                    <a:p>
+                      <a:r>
+                        <a:t>172</a:t>
                       </a:r>
                     </a:p>
                   </a:txBody>
@@ -3637,67 +3637,163 @@
                     <a:lstStyle/>
                     <a:p>
                       <a:r>
-                        <a:t>Alathur</a:t>
-                      </a:r>
-                    </a:p>
-                  </a:txBody>
-                  <a:tcPr/>
-                </a:tc>
-                <a:tc>
-                  <a:txBody>
-                    <a:bodyPr/>
-                    <a:lstStyle/>
-                    <a:p>
-                      <a:r>
-                        <a:t>0</a:t>
-                      </a:r>
-                    </a:p>
-                  </a:txBody>
-                  <a:tcPr/>
-                </a:tc>
-                <a:tc>
-                  <a:txBody>
-                    <a:bodyPr/>
-                    <a:lstStyle/>
-                    <a:p>
-                      <a:r>
-                        <a:t>25</a:t>
-                      </a:r>
-                    </a:p>
-                  </a:txBody>
-                  <a:tcPr/>
-                </a:tc>
-                <a:tc>
-                  <a:txBody>
-                    <a:bodyPr/>
-                    <a:lstStyle/>
-                    <a:p>
-                      <a:r>
-                        <a:t>2</a:t>
-                      </a:r>
-                    </a:p>
-                  </a:txBody>
-                  <a:tcPr/>
-                </a:tc>
-                <a:tc>
-                  <a:txBody>
-                    <a:bodyPr/>
-                    <a:lstStyle/>
-                    <a:p>
-                      <a:r>
-                        <a:t>0</a:t>
-                      </a:r>
-                    </a:p>
-                  </a:txBody>
-                  <a:tcPr/>
-                </a:tc>
-                <a:tc>
-                  <a:txBody>
-                    <a:bodyPr/>
-                    <a:lstStyle/>
-                    <a:p>
-                      <a:r>
-                        <a:t>6</a:t>
+                        <a:t>Krsg</a:t>
+                      </a:r>
+                    </a:p>
+                  </a:txBody>
+                  <a:tcPr/>
+                </a:tc>
+                <a:tc>
+                  <a:txBody>
+                    <a:bodyPr/>
+                    <a:lstStyle/>
+                    <a:p>
+                      <a:r>
+                        <a:t>0</a:t>
+                      </a:r>
+                    </a:p>
+                  </a:txBody>
+                  <a:tcPr/>
+                </a:tc>
+                <a:tc>
+                  <a:txBody>
+                    <a:bodyPr/>
+                    <a:lstStyle/>
+                    <a:p>
+                      <a:r>
+                        <a:t>0</a:t>
+                      </a:r>
+                    </a:p>
+                  </a:txBody>
+                  <a:tcPr/>
+                </a:tc>
+                <a:tc>
+                  <a:txBody>
+                    <a:bodyPr/>
+                    <a:lstStyle/>
+                    <a:p>
+                      <a:r>
+                        <a:t>0</a:t>
+                      </a:r>
+                    </a:p>
+                  </a:txBody>
+                  <a:tcPr/>
+                </a:tc>
+                <a:tc>
+                  <a:txBody>
+                    <a:bodyPr/>
+                    <a:lstStyle/>
+                    <a:p>
+                      <a:r>
+                        <a:t>0</a:t>
+                      </a:r>
+                    </a:p>
+                  </a:txBody>
+                  <a:tcPr/>
+                </a:tc>
+                <a:tc>
+                  <a:txBody>
+                    <a:bodyPr/>
+                    <a:lstStyle/>
+                    <a:p>
+                      <a:r>
+                        <a:t>0</a:t>
+                      </a:r>
+                    </a:p>
+                  </a:txBody>
+                  <a:tcPr/>
+                </a:tc>
+                <a:tc>
+                  <a:txBody>
+                    <a:bodyPr/>
+                    <a:lstStyle/>
+                    <a:p>
+                      <a:r>
+                        <a:t>0</a:t>
+                      </a:r>
+                    </a:p>
+                  </a:txBody>
+                  <a:tcPr/>
+                </a:tc>
+                <a:tc>
+                  <a:txBody>
+                    <a:bodyPr/>
+                    <a:lstStyle/>
+                    <a:p>
+                      <a:r>
+                        <a:t>0</a:t>
+                      </a:r>
+                    </a:p>
+                  </a:txBody>
+                  <a:tcPr/>
+                </a:tc>
+                <a:tc>
+                  <a:txBody>
+                    <a:bodyPr/>
+                    <a:lstStyle/>
+                    <a:p>
+                      <a:r>
+                        <a:t>0</a:t>
+                      </a:r>
+                    </a:p>
+                  </a:txBody>
+                  <a:tcPr/>
+                </a:tc>
+                <a:tc>
+                  <a:txBody>
+                    <a:bodyPr/>
+                    <a:lstStyle/>
+                    <a:p>
+                      <a:r>
+                        <a:t>0</a:t>
+                      </a:r>
+                    </a:p>
+                  </a:txBody>
+                  <a:tcPr/>
+                </a:tc>
+                <a:tc>
+                  <a:txBody>
+                    <a:bodyPr/>
+                    <a:lstStyle/>
+                    <a:p>
+                      <a:r>
+                        <a:t>0</a:t>
+                      </a:r>
+                    </a:p>
+                  </a:txBody>
+                  <a:tcPr/>
+                </a:tc>
+                <a:tc>
+                  <a:txBody>
+                    <a:bodyPr/>
+                    <a:lstStyle/>
+                    <a:p>
+                      <a:r>
+                        <a:t>0</a:t>
+                      </a:r>
+                    </a:p>
+                  </a:txBody>
+                  <a:tcPr/>
+                </a:tc>
+                <a:tc>
+                  <a:txBody>
+                    <a:bodyPr/>
+                    <a:lstStyle/>
+                    <a:p>
+                      <a:r>
+                        <a:t>0</a:t>
+                      </a:r>
+                    </a:p>
+                  </a:txBody>
+                  <a:tcPr/>
+                </a:tc>
+                <a:tc>
+                  <a:txBody>
+                    <a:bodyPr/>
+                    <a:lstStyle/>
+                    <a:p>
+                      <a:r>
+                        <a:t>0</a:t>
                       </a:r>
                     </a:p>
                   </a:txBody>
@@ -3745,115 +3841,19 @@
                     <a:lstStyle/>
                     <a:p>
                       <a:r>
-                        <a:t>28</a:t>
-                      </a:r>
-                    </a:p>
-                  </a:txBody>
-                  <a:tcPr/>
-                </a:tc>
-                <a:tc>
-                  <a:txBody>
-                    <a:bodyPr/>
-                    <a:lstStyle/>
-                    <a:p>
-                      <a:r>
-                        <a:t>0</a:t>
-                      </a:r>
-                    </a:p>
-                  </a:txBody>
-                  <a:tcPr/>
-                </a:tc>
-                <a:tc>
-                  <a:txBody>
-                    <a:bodyPr/>
-                    <a:lstStyle/>
-                    <a:p>
-                      <a:r>
-                        <a:t>4</a:t>
-                      </a:r>
-                    </a:p>
-                  </a:txBody>
-                  <a:tcPr/>
-                </a:tc>
-                <a:tc>
-                  <a:txBody>
-                    <a:bodyPr/>
-                    <a:lstStyle/>
-                    <a:p>
-                      <a:r>
-                        <a:t>0</a:t>
-                      </a:r>
-                    </a:p>
-                  </a:txBody>
-                  <a:tcPr/>
-                </a:tc>
-                <a:tc>
-                  <a:txBody>
-                    <a:bodyPr/>
-                    <a:lstStyle/>
-                    <a:p>
-                      <a:r>
-                        <a:t>0</a:t>
-                      </a:r>
-                    </a:p>
-                  </a:txBody>
-                  <a:tcPr/>
-                </a:tc>
-                <a:tc>
-                  <a:txBody>
-                    <a:bodyPr/>
-                    <a:lstStyle/>
-                    <a:p>
-                      <a:r>
-                        <a:t>1</a:t>
-                      </a:r>
-                    </a:p>
-                  </a:txBody>
-                  <a:tcPr/>
-                </a:tc>
-                <a:tc>
-                  <a:txBody>
-                    <a:bodyPr/>
-                    <a:lstStyle/>
-                    <a:p>
-                      <a:r>
-                        <a:t>1</a:t>
-                      </a:r>
-                    </a:p>
-                  </a:txBody>
-                  <a:tcPr/>
-                </a:tc>
-                <a:tc>
-                  <a:txBody>
-                    <a:bodyPr/>
-                    <a:lstStyle/>
-                    <a:p>
-                      <a:r>
-                        <a:t>0</a:t>
-                      </a:r>
-                    </a:p>
-                  </a:txBody>
-                  <a:tcPr/>
-                </a:tc>
-                <a:tc>
-                  <a:txBody>
-                    <a:bodyPr/>
-                    <a:lstStyle/>
-                    <a:p>
-                      <a:r>
-                        <a:t>270</a:t>
-                      </a:r>
-                    </a:p>
-                  </a:txBody>
-                  <a:tcPr/>
-                </a:tc>
-                <a:tc>
-                  <a:txBody>
-                    <a:bodyPr/>
-                    <a:lstStyle/>
-                    <a:p>
-                      <a:r>
-                        <a:t>338</a:t>
+                        <a:t>1041</a:t>
+                      </a:r>
+                    </a:p>
+                  </a:txBody>
+                  <a:tcPr/>
+                </a:tc>
+                <a:tc>
+                  <a:txBody>
+                    <a:bodyPr/>
+                    <a:lstStyle/>
+                    <a:p>
+                      <a:r>
+                        <a:t>1042</a:t>
                       </a:r>
                     </a:p>
                   </a:txBody>
@@ -3867,223 +3867,223 @@
                     <a:lstStyle/>
                     <a:p>
                       <a:r>
-                        <a:t>Arcolab</a:t>
-                      </a:r>
-                    </a:p>
-                  </a:txBody>
-                  <a:tcPr/>
-                </a:tc>
-                <a:tc>
-                  <a:txBody>
-                    <a:bodyPr/>
-                    <a:lstStyle/>
-                    <a:p>
-                      <a:r>
-                        <a:t>0</a:t>
-                      </a:r>
-                    </a:p>
-                  </a:txBody>
-                  <a:tcPr/>
-                </a:tc>
-                <a:tc>
-                  <a:txBody>
-                    <a:bodyPr/>
-                    <a:lstStyle/>
-                    <a:p>
-                      <a:r>
-                        <a:t>0</a:t>
-                      </a:r>
-                    </a:p>
-                  </a:txBody>
-                  <a:tcPr/>
-                </a:tc>
-                <a:tc>
-                  <a:txBody>
-                    <a:bodyPr/>
-                    <a:lstStyle/>
-                    <a:p>
-                      <a:r>
-                        <a:t>0</a:t>
-                      </a:r>
-                    </a:p>
-                  </a:txBody>
-                  <a:tcPr/>
-                </a:tc>
-                <a:tc>
-                  <a:txBody>
-                    <a:bodyPr/>
-                    <a:lstStyle/>
-                    <a:p>
-                      <a:r>
-                        <a:t>0</a:t>
-                      </a:r>
-                    </a:p>
-                  </a:txBody>
-                  <a:tcPr/>
-                </a:tc>
-                <a:tc>
-                  <a:txBody>
-                    <a:bodyPr/>
-                    <a:lstStyle/>
-                    <a:p>
-                      <a:r>
-                        <a:t>0</a:t>
-                      </a:r>
-                    </a:p>
-                  </a:txBody>
-                  <a:tcPr/>
-                </a:tc>
-                <a:tc>
-                  <a:txBody>
-                    <a:bodyPr/>
-                    <a:lstStyle/>
-                    <a:p>
-                      <a:r>
-                        <a:t>0</a:t>
-                      </a:r>
-                    </a:p>
-                  </a:txBody>
-                  <a:tcPr/>
-                </a:tc>
-                <a:tc>
-                  <a:txBody>
-                    <a:bodyPr/>
-                    <a:lstStyle/>
-                    <a:p>
-                      <a:r>
-                        <a:t>0</a:t>
-                      </a:r>
-                    </a:p>
-                  </a:txBody>
-                  <a:tcPr/>
-                </a:tc>
-                <a:tc>
-                  <a:txBody>
-                    <a:bodyPr/>
-                    <a:lstStyle/>
-                    <a:p>
-                      <a:r>
-                        <a:t>0</a:t>
-                      </a:r>
-                    </a:p>
-                  </a:txBody>
-                  <a:tcPr/>
-                </a:tc>
-                <a:tc>
-                  <a:txBody>
-                    <a:bodyPr/>
-                    <a:lstStyle/>
-                    <a:p>
-                      <a:r>
-                        <a:t>3</a:t>
-                      </a:r>
-                    </a:p>
-                  </a:txBody>
-                  <a:tcPr/>
-                </a:tc>
-                <a:tc>
-                  <a:txBody>
-                    <a:bodyPr/>
-                    <a:lstStyle/>
-                    <a:p>
-                      <a:r>
-                        <a:t>0</a:t>
-                      </a:r>
-                    </a:p>
-                  </a:txBody>
-                  <a:tcPr/>
-                </a:tc>
-                <a:tc>
-                  <a:txBody>
-                    <a:bodyPr/>
-                    <a:lstStyle/>
-                    <a:p>
-                      <a:r>
-                        <a:t>0</a:t>
-                      </a:r>
-                    </a:p>
-                  </a:txBody>
-                  <a:tcPr/>
-                </a:tc>
-                <a:tc>
-                  <a:txBody>
-                    <a:bodyPr/>
-                    <a:lstStyle/>
-                    <a:p>
-                      <a:r>
-                        <a:t>0</a:t>
-                      </a:r>
-                    </a:p>
-                  </a:txBody>
-                  <a:tcPr/>
-                </a:tc>
-                <a:tc>
-                  <a:txBody>
-                    <a:bodyPr/>
-                    <a:lstStyle/>
-                    <a:p>
-                      <a:r>
-                        <a:t>0</a:t>
-                      </a:r>
-                    </a:p>
-                  </a:txBody>
-                  <a:tcPr/>
-                </a:tc>
-                <a:tc>
-                  <a:txBody>
-                    <a:bodyPr/>
-                    <a:lstStyle/>
-                    <a:p>
-                      <a:r>
-                        <a:t>0</a:t>
-                      </a:r>
-                    </a:p>
-                  </a:txBody>
-                  <a:tcPr/>
-                </a:tc>
-                <a:tc>
-                  <a:txBody>
-                    <a:bodyPr/>
-                    <a:lstStyle/>
-                    <a:p>
-                      <a:r>
-                        <a:t>0</a:t>
-                      </a:r>
-                    </a:p>
-                  </a:txBody>
-                  <a:tcPr/>
-                </a:tc>
-                <a:tc>
-                  <a:txBody>
-                    <a:bodyPr/>
-                    <a:lstStyle/>
-                    <a:p>
-                      <a:r>
-                        <a:t>0</a:t>
-                      </a:r>
-                    </a:p>
-                  </a:txBody>
-                  <a:tcPr/>
-                </a:tc>
-                <a:tc>
-                  <a:txBody>
-                    <a:bodyPr/>
-                    <a:lstStyle/>
-                    <a:p>
-                      <a:r>
-                        <a:t>169</a:t>
-                      </a:r>
-                    </a:p>
-                  </a:txBody>
-                  <a:tcPr/>
-                </a:tc>
-                <a:tc>
-                  <a:txBody>
-                    <a:bodyPr/>
-                    <a:lstStyle/>
-                    <a:p>
-                      <a:r>
-                        <a:t>172</a:t>
+                        <a:t>Alathur</a:t>
+                      </a:r>
+                    </a:p>
+                  </a:txBody>
+                  <a:tcPr/>
+                </a:tc>
+                <a:tc>
+                  <a:txBody>
+                    <a:bodyPr/>
+                    <a:lstStyle/>
+                    <a:p>
+                      <a:r>
+                        <a:t>0</a:t>
+                      </a:r>
+                    </a:p>
+                  </a:txBody>
+                  <a:tcPr/>
+                </a:tc>
+                <a:tc>
+                  <a:txBody>
+                    <a:bodyPr/>
+                    <a:lstStyle/>
+                    <a:p>
+                      <a:r>
+                        <a:t>47</a:t>
+                      </a:r>
+                    </a:p>
+                  </a:txBody>
+                  <a:tcPr/>
+                </a:tc>
+                <a:tc>
+                  <a:txBody>
+                    <a:bodyPr/>
+                    <a:lstStyle/>
+                    <a:p>
+                      <a:r>
+                        <a:t>7</a:t>
+                      </a:r>
+                    </a:p>
+                  </a:txBody>
+                  <a:tcPr/>
+                </a:tc>
+                <a:tc>
+                  <a:txBody>
+                    <a:bodyPr/>
+                    <a:lstStyle/>
+                    <a:p>
+                      <a:r>
+                        <a:t>0</a:t>
+                      </a:r>
+                    </a:p>
+                  </a:txBody>
+                  <a:tcPr/>
+                </a:tc>
+                <a:tc>
+                  <a:txBody>
+                    <a:bodyPr/>
+                    <a:lstStyle/>
+                    <a:p>
+                      <a:r>
+                        <a:t>13</a:t>
+                      </a:r>
+                    </a:p>
+                  </a:txBody>
+                  <a:tcPr/>
+                </a:tc>
+                <a:tc>
+                  <a:txBody>
+                    <a:bodyPr/>
+                    <a:lstStyle/>
+                    <a:p>
+                      <a:r>
+                        <a:t>0</a:t>
+                      </a:r>
+                    </a:p>
+                  </a:txBody>
+                  <a:tcPr/>
+                </a:tc>
+                <a:tc>
+                  <a:txBody>
+                    <a:bodyPr/>
+                    <a:lstStyle/>
+                    <a:p>
+                      <a:r>
+                        <a:t>0</a:t>
+                      </a:r>
+                    </a:p>
+                  </a:txBody>
+                  <a:tcPr/>
+                </a:tc>
+                <a:tc>
+                  <a:txBody>
+                    <a:bodyPr/>
+                    <a:lstStyle/>
+                    <a:p>
+                      <a:r>
+                        <a:t>5</a:t>
+                      </a:r>
+                    </a:p>
+                  </a:txBody>
+                  <a:tcPr/>
+                </a:tc>
+                <a:tc>
+                  <a:txBody>
+                    <a:bodyPr/>
+                    <a:lstStyle/>
+                    <a:p>
+                      <a:r>
+                        <a:t>45</a:t>
+                      </a:r>
+                    </a:p>
+                  </a:txBody>
+                  <a:tcPr/>
+                </a:tc>
+                <a:tc>
+                  <a:txBody>
+                    <a:bodyPr/>
+                    <a:lstStyle/>
+                    <a:p>
+                      <a:r>
+                        <a:t>0</a:t>
+                      </a:r>
+                    </a:p>
+                  </a:txBody>
+                  <a:tcPr/>
+                </a:tc>
+                <a:tc>
+                  <a:txBody>
+                    <a:bodyPr/>
+                    <a:lstStyle/>
+                    <a:p>
+                      <a:r>
+                        <a:t>4</a:t>
+                      </a:r>
+                    </a:p>
+                  </a:txBody>
+                  <a:tcPr/>
+                </a:tc>
+                <a:tc>
+                  <a:txBody>
+                    <a:bodyPr/>
+                    <a:lstStyle/>
+                    <a:p>
+                      <a:r>
+                        <a:t>1</a:t>
+                      </a:r>
+                    </a:p>
+                  </a:txBody>
+                  <a:tcPr/>
+                </a:tc>
+                <a:tc>
+                  <a:txBody>
+                    <a:bodyPr/>
+                    <a:lstStyle/>
+                    <a:p>
+                      <a:r>
+                        <a:t>0</a:t>
+                      </a:r>
+                    </a:p>
+                  </a:txBody>
+                  <a:tcPr/>
+                </a:tc>
+                <a:tc>
+                  <a:txBody>
+                    <a:bodyPr/>
+                    <a:lstStyle/>
+                    <a:p>
+                      <a:r>
+                        <a:t>1</a:t>
+                      </a:r>
+                    </a:p>
+                  </a:txBody>
+                  <a:tcPr/>
+                </a:tc>
+                <a:tc>
+                  <a:txBody>
+                    <a:bodyPr/>
+                    <a:lstStyle/>
+                    <a:p>
+                      <a:r>
+                        <a:t>1</a:t>
+                      </a:r>
+                    </a:p>
+                  </a:txBody>
+                  <a:tcPr/>
+                </a:tc>
+                <a:tc>
+                  <a:txBody>
+                    <a:bodyPr/>
+                    <a:lstStyle/>
+                    <a:p>
+                      <a:r>
+                        <a:t>0</a:t>
+                      </a:r>
+                    </a:p>
+                  </a:txBody>
+                  <a:tcPr/>
+                </a:tc>
+                <a:tc>
+                  <a:txBody>
+                    <a:bodyPr/>
+                    <a:lstStyle/>
+                    <a:p>
+                      <a:r>
+                        <a:t>214</a:t>
+                      </a:r>
+                    </a:p>
+                  </a:txBody>
+                  <a:tcPr/>
+                </a:tc>
+                <a:tc>
+                  <a:txBody>
+                    <a:bodyPr/>
+                    <a:lstStyle/>
+                    <a:p>
+                      <a:r>
+                        <a:t>338</a:t>
                       </a:r>
                     </a:p>
                   </a:txBody>
@@ -4121,19 +4121,19 @@
                     <a:lstStyle/>
                     <a:p>
                       <a:r>
-                        <a:t>4</a:t>
-                      </a:r>
-                    </a:p>
-                  </a:txBody>
-                  <a:tcPr/>
-                </a:tc>
-                <a:tc>
-                  <a:txBody>
-                    <a:bodyPr/>
-                    <a:lstStyle/>
-                    <a:p>
-                      <a:r>
-                        <a:t>6</a:t>
+                        <a:t>8</a:t>
+                      </a:r>
+                    </a:p>
+                  </a:txBody>
+                  <a:tcPr/>
+                </a:tc>
+                <a:tc>
+                  <a:txBody>
+                    <a:bodyPr/>
+                    <a:lstStyle/>
+                    <a:p>
+                      <a:r>
+                        <a:t>11</a:t>
                       </a:r>
                     </a:p>
                   </a:txBody>
@@ -4157,79 +4157,79 @@
                     <a:lstStyle/>
                     <a:p>
                       <a:r>
-                        <a:t>6</a:t>
-                      </a:r>
-                    </a:p>
-                  </a:txBody>
-                  <a:tcPr/>
-                </a:tc>
-                <a:tc>
-                  <a:txBody>
-                    <a:bodyPr/>
-                    <a:lstStyle/>
-                    <a:p>
-                      <a:r>
-                        <a:t>0</a:t>
-                      </a:r>
-                    </a:p>
-                  </a:txBody>
-                  <a:tcPr/>
-                </a:tc>
-                <a:tc>
-                  <a:txBody>
-                    <a:bodyPr/>
-                    <a:lstStyle/>
-                    <a:p>
-                      <a:r>
-                        <a:t>0</a:t>
-                      </a:r>
-                    </a:p>
-                  </a:txBody>
-                  <a:tcPr/>
-                </a:tc>
-                <a:tc>
-                  <a:txBody>
-                    <a:bodyPr/>
-                    <a:lstStyle/>
-                    <a:p>
-                      <a:r>
-                        <a:t>0</a:t>
-                      </a:r>
-                    </a:p>
-                  </a:txBody>
-                  <a:tcPr/>
-                </a:tc>
-                <a:tc>
-                  <a:txBody>
-                    <a:bodyPr/>
-                    <a:lstStyle/>
-                    <a:p>
-                      <a:r>
-                        <a:t>17</a:t>
-                      </a:r>
-                    </a:p>
-                  </a:txBody>
-                  <a:tcPr/>
-                </a:tc>
-                <a:tc>
-                  <a:txBody>
-                    <a:bodyPr/>
-                    <a:lstStyle/>
-                    <a:p>
-                      <a:r>
-                        <a:t>0</a:t>
-                      </a:r>
-                    </a:p>
-                  </a:txBody>
-                  <a:tcPr/>
-                </a:tc>
-                <a:tc>
-                  <a:txBody>
-                    <a:bodyPr/>
-                    <a:lstStyle/>
-                    <a:p>
-                      <a:r>
-                        <a:t>6</a:t>
+                        <a:t>13</a:t>
+                      </a:r>
+                    </a:p>
+                  </a:txBody>
+                  <a:tcPr/>
+                </a:tc>
+                <a:tc>
+                  <a:txBody>
+                    <a:bodyPr/>
+                    <a:lstStyle/>
+                    <a:p>
+                      <a:r>
+                        <a:t>0</a:t>
+                      </a:r>
+                    </a:p>
+                  </a:txBody>
+                  <a:tcPr/>
+                </a:tc>
+                <a:tc>
+                  <a:txBody>
+                    <a:bodyPr/>
+                    <a:lstStyle/>
+                    <a:p>
+                      <a:r>
+                        <a:t>0</a:t>
+                      </a:r>
+                    </a:p>
+                  </a:txBody>
+                  <a:tcPr/>
+                </a:tc>
+                <a:tc>
+                  <a:txBody>
+                    <a:bodyPr/>
+                    <a:lstStyle/>
+                    <a:p>
+                      <a:r>
+                        <a:t>0</a:t>
+                      </a:r>
+                    </a:p>
+                  </a:txBody>
+                  <a:tcPr/>
+                </a:tc>
+                <a:tc>
+                  <a:txBody>
+                    <a:bodyPr/>
+                    <a:lstStyle/>
+                    <a:p>
+                      <a:r>
+                        <a:t>32</a:t>
+                      </a:r>
+                    </a:p>
+                  </a:txBody>
+                  <a:tcPr/>
+                </a:tc>
+                <a:tc>
+                  <a:txBody>
+                    <a:bodyPr/>
+                    <a:lstStyle/>
+                    <a:p>
+                      <a:r>
+                        <a:t>0</a:t>
+                      </a:r>
+                    </a:p>
+                  </a:txBody>
+                  <a:tcPr/>
+                </a:tc>
+                <a:tc>
+                  <a:txBody>
+                    <a:bodyPr/>
+                    <a:lstStyle/>
+                    <a:p>
+                      <a:r>
+                        <a:t>10</a:t>
                       </a:r>
                     </a:p>
                   </a:txBody>
@@ -4301,7 +4301,7 @@
                     <a:lstStyle/>
                     <a:p>
                       <a:r>
-                        <a:t>195</a:t>
+                        <a:t>160</a:t>
                       </a:r>
                     </a:p>
                   </a:txBody>
@@ -4351,187 +4351,187 @@
                     <a:lstStyle/>
                     <a:p>
                       <a:r>
-                        <a:t>2</a:t>
-                      </a:r>
-                    </a:p>
-                  </a:txBody>
-                  <a:tcPr/>
-                </a:tc>
-                <a:tc>
-                  <a:txBody>
-                    <a:bodyPr/>
-                    <a:lstStyle/>
-                    <a:p>
-                      <a:r>
-                        <a:t>0</a:t>
-                      </a:r>
-                    </a:p>
-                  </a:txBody>
-                  <a:tcPr/>
-                </a:tc>
-                <a:tc>
-                  <a:txBody>
-                    <a:bodyPr/>
-                    <a:lstStyle/>
-                    <a:p>
-                      <a:r>
-                        <a:t>0</a:t>
-                      </a:r>
-                    </a:p>
-                  </a:txBody>
-                  <a:tcPr/>
-                </a:tc>
-                <a:tc>
-                  <a:txBody>
-                    <a:bodyPr/>
-                    <a:lstStyle/>
-                    <a:p>
-                      <a:r>
-                        <a:t>0</a:t>
-                      </a:r>
-                    </a:p>
-                  </a:txBody>
-                  <a:tcPr/>
-                </a:tc>
-                <a:tc>
-                  <a:txBody>
-                    <a:bodyPr/>
-                    <a:lstStyle/>
-                    <a:p>
-                      <a:r>
-                        <a:t>0</a:t>
-                      </a:r>
-                    </a:p>
-                  </a:txBody>
-                  <a:tcPr/>
-                </a:tc>
-                <a:tc>
-                  <a:txBody>
-                    <a:bodyPr/>
-                    <a:lstStyle/>
-                    <a:p>
-                      <a:r>
-                        <a:t>0</a:t>
-                      </a:r>
-                    </a:p>
-                  </a:txBody>
-                  <a:tcPr/>
-                </a:tc>
-                <a:tc>
-                  <a:txBody>
-                    <a:bodyPr/>
-                    <a:lstStyle/>
-                    <a:p>
-                      <a:r>
-                        <a:t>0</a:t>
-                      </a:r>
-                    </a:p>
-                  </a:txBody>
-                  <a:tcPr/>
-                </a:tc>
-                <a:tc>
-                  <a:txBody>
-                    <a:bodyPr/>
-                    <a:lstStyle/>
-                    <a:p>
-                      <a:r>
-                        <a:t>0</a:t>
-                      </a:r>
-                    </a:p>
-                  </a:txBody>
-                  <a:tcPr/>
-                </a:tc>
-                <a:tc>
-                  <a:txBody>
-                    <a:bodyPr/>
-                    <a:lstStyle/>
-                    <a:p>
-                      <a:r>
-                        <a:t>0</a:t>
-                      </a:r>
-                    </a:p>
-                  </a:txBody>
-                  <a:tcPr/>
-                </a:tc>
-                <a:tc>
-                  <a:txBody>
-                    <a:bodyPr/>
-                    <a:lstStyle/>
-                    <a:p>
-                      <a:r>
-                        <a:t>0</a:t>
-                      </a:r>
-                    </a:p>
-                  </a:txBody>
-                  <a:tcPr/>
-                </a:tc>
-                <a:tc>
-                  <a:txBody>
-                    <a:bodyPr/>
-                    <a:lstStyle/>
-                    <a:p>
-                      <a:r>
-                        <a:t>0</a:t>
-                      </a:r>
-                    </a:p>
-                  </a:txBody>
-                  <a:tcPr/>
-                </a:tc>
-                <a:tc>
-                  <a:txBody>
-                    <a:bodyPr/>
-                    <a:lstStyle/>
-                    <a:p>
-                      <a:r>
-                        <a:t>0</a:t>
-                      </a:r>
-                    </a:p>
-                  </a:txBody>
-                  <a:tcPr/>
-                </a:tc>
-                <a:tc>
-                  <a:txBody>
-                    <a:bodyPr/>
-                    <a:lstStyle/>
-                    <a:p>
-                      <a:r>
-                        <a:t>0</a:t>
-                      </a:r>
-                    </a:p>
-                  </a:txBody>
-                  <a:tcPr/>
-                </a:tc>
-                <a:tc>
-                  <a:txBody>
-                    <a:bodyPr/>
-                    <a:lstStyle/>
-                    <a:p>
-                      <a:r>
-                        <a:t>0</a:t>
-                      </a:r>
-                    </a:p>
-                  </a:txBody>
-                  <a:tcPr/>
-                </a:tc>
-                <a:tc>
-                  <a:txBody>
-                    <a:bodyPr/>
-                    <a:lstStyle/>
-                    <a:p>
-                      <a:r>
-                        <a:t>0</a:t>
-                      </a:r>
-                    </a:p>
-                  </a:txBody>
-                  <a:tcPr/>
-                </a:tc>
-                <a:tc>
-                  <a:txBody>
-                    <a:bodyPr/>
-                    <a:lstStyle/>
-                    <a:p>
-                      <a:r>
-                        <a:t>65</a:t>
+                        <a:t>3</a:t>
+                      </a:r>
+                    </a:p>
+                  </a:txBody>
+                  <a:tcPr/>
+                </a:tc>
+                <a:tc>
+                  <a:txBody>
+                    <a:bodyPr/>
+                    <a:lstStyle/>
+                    <a:p>
+                      <a:r>
+                        <a:t>0</a:t>
+                      </a:r>
+                    </a:p>
+                  </a:txBody>
+                  <a:tcPr/>
+                </a:tc>
+                <a:tc>
+                  <a:txBody>
+                    <a:bodyPr/>
+                    <a:lstStyle/>
+                    <a:p>
+                      <a:r>
+                        <a:t>0</a:t>
+                      </a:r>
+                    </a:p>
+                  </a:txBody>
+                  <a:tcPr/>
+                </a:tc>
+                <a:tc>
+                  <a:txBody>
+                    <a:bodyPr/>
+                    <a:lstStyle/>
+                    <a:p>
+                      <a:r>
+                        <a:t>0</a:t>
+                      </a:r>
+                    </a:p>
+                  </a:txBody>
+                  <a:tcPr/>
+                </a:tc>
+                <a:tc>
+                  <a:txBody>
+                    <a:bodyPr/>
+                    <a:lstStyle/>
+                    <a:p>
+                      <a:r>
+                        <a:t>0</a:t>
+                      </a:r>
+                    </a:p>
+                  </a:txBody>
+                  <a:tcPr/>
+                </a:tc>
+                <a:tc>
+                  <a:txBody>
+                    <a:bodyPr/>
+                    <a:lstStyle/>
+                    <a:p>
+                      <a:r>
+                        <a:t>0</a:t>
+                      </a:r>
+                    </a:p>
+                  </a:txBody>
+                  <a:tcPr/>
+                </a:tc>
+                <a:tc>
+                  <a:txBody>
+                    <a:bodyPr/>
+                    <a:lstStyle/>
+                    <a:p>
+                      <a:r>
+                        <a:t>0</a:t>
+                      </a:r>
+                    </a:p>
+                  </a:txBody>
+                  <a:tcPr/>
+                </a:tc>
+                <a:tc>
+                  <a:txBody>
+                    <a:bodyPr/>
+                    <a:lstStyle/>
+                    <a:p>
+                      <a:r>
+                        <a:t>0</a:t>
+                      </a:r>
+                    </a:p>
+                  </a:txBody>
+                  <a:tcPr/>
+                </a:tc>
+                <a:tc>
+                  <a:txBody>
+                    <a:bodyPr/>
+                    <a:lstStyle/>
+                    <a:p>
+                      <a:r>
+                        <a:t>0</a:t>
+                      </a:r>
+                    </a:p>
+                  </a:txBody>
+                  <a:tcPr/>
+                </a:tc>
+                <a:tc>
+                  <a:txBody>
+                    <a:bodyPr/>
+                    <a:lstStyle/>
+                    <a:p>
+                      <a:r>
+                        <a:t>0</a:t>
+                      </a:r>
+                    </a:p>
+                  </a:txBody>
+                  <a:tcPr/>
+                </a:tc>
+                <a:tc>
+                  <a:txBody>
+                    <a:bodyPr/>
+                    <a:lstStyle/>
+                    <a:p>
+                      <a:r>
+                        <a:t>0</a:t>
+                      </a:r>
+                    </a:p>
+                  </a:txBody>
+                  <a:tcPr/>
+                </a:tc>
+                <a:tc>
+                  <a:txBody>
+                    <a:bodyPr/>
+                    <a:lstStyle/>
+                    <a:p>
+                      <a:r>
+                        <a:t>0</a:t>
+                      </a:r>
+                    </a:p>
+                  </a:txBody>
+                  <a:tcPr/>
+                </a:tc>
+                <a:tc>
+                  <a:txBody>
+                    <a:bodyPr/>
+                    <a:lstStyle/>
+                    <a:p>
+                      <a:r>
+                        <a:t>0</a:t>
+                      </a:r>
+                    </a:p>
+                  </a:txBody>
+                  <a:tcPr/>
+                </a:tc>
+                <a:tc>
+                  <a:txBody>
+                    <a:bodyPr/>
+                    <a:lstStyle/>
+                    <a:p>
+                      <a:r>
+                        <a:t>0</a:t>
+                      </a:r>
+                    </a:p>
+                  </a:txBody>
+                  <a:tcPr/>
+                </a:tc>
+                <a:tc>
+                  <a:txBody>
+                    <a:bodyPr/>
+                    <a:lstStyle/>
+                    <a:p>
+                      <a:r>
+                        <a:t>0</a:t>
+                      </a:r>
+                    </a:p>
+                  </a:txBody>
+                  <a:tcPr/>
+                </a:tc>
+                <a:tc>
+                  <a:txBody>
+                    <a:bodyPr/>
+                    <a:lstStyle/>
+                    <a:p>
+                      <a:r>
+                        <a:t>64</a:t>
                       </a:r>
                     </a:p>
                   </a:txBody>
@@ -4967,31 +4967,31 @@
                     <a:lstStyle/>
                     <a:p>
                       <a:r>
-                        <a:t>1</a:t>
-                      </a:r>
-                    </a:p>
-                  </a:txBody>
-                  <a:tcPr/>
-                </a:tc>
-                <a:tc>
-                  <a:txBody>
-                    <a:bodyPr/>
-                    <a:lstStyle/>
-                    <a:p>
-                      <a:r>
-                        <a:t>0</a:t>
-                      </a:r>
-                    </a:p>
-                  </a:txBody>
-                  <a:tcPr/>
-                </a:tc>
-                <a:tc>
-                  <a:txBody>
-                    <a:bodyPr/>
-                    <a:lstStyle/>
-                    <a:p>
-                      <a:r>
-                        <a:t>210</a:t>
+                        <a:t>2</a:t>
+                      </a:r>
+                    </a:p>
+                  </a:txBody>
+                  <a:tcPr/>
+                </a:tc>
+                <a:tc>
+                  <a:txBody>
+                    <a:bodyPr/>
+                    <a:lstStyle/>
+                    <a:p>
+                      <a:r>
+                        <a:t>0</a:t>
+                      </a:r>
+                    </a:p>
+                  </a:txBody>
+                  <a:tcPr/>
+                </a:tc>
+                <a:tc>
+                  <a:txBody>
+                    <a:bodyPr/>
+                    <a:lstStyle/>
+                    <a:p>
+                      <a:r>
+                        <a:t>209</a:t>
                       </a:r>
                     </a:p>
                   </a:txBody>
@@ -5161,43 +5161,43 @@
                     <a:lstStyle/>
                     <a:p>
                       <a:r>
+                        <a:t>0</a:t>
+                      </a:r>
+                    </a:p>
+                  </a:txBody>
+                  <a:tcPr/>
+                </a:tc>
+                <a:tc>
+                  <a:txBody>
+                    <a:bodyPr/>
+                    <a:lstStyle/>
+                    <a:p>
+                      <a:r>
+                        <a:t>0</a:t>
+                      </a:r>
+                    </a:p>
+                  </a:txBody>
+                  <a:tcPr/>
+                </a:tc>
+                <a:tc>
+                  <a:txBody>
+                    <a:bodyPr/>
+                    <a:lstStyle/>
+                    <a:p>
+                      <a:r>
+                        <a:t>0</a:t>
+                      </a:r>
+                    </a:p>
+                  </a:txBody>
+                  <a:tcPr/>
+                </a:tc>
+                <a:tc>
+                  <a:txBody>
+                    <a:bodyPr/>
+                    <a:lstStyle/>
+                    <a:p>
+                      <a:r>
                         <a:t>2</a:t>
-                      </a:r>
-                    </a:p>
-                  </a:txBody>
-                  <a:tcPr/>
-                </a:tc>
-                <a:tc>
-                  <a:txBody>
-                    <a:bodyPr/>
-                    <a:lstStyle/>
-                    <a:p>
-                      <a:r>
-                        <a:t>0</a:t>
-                      </a:r>
-                    </a:p>
-                  </a:txBody>
-                  <a:tcPr/>
-                </a:tc>
-                <a:tc>
-                  <a:txBody>
-                    <a:bodyPr/>
-                    <a:lstStyle/>
-                    <a:p>
-                      <a:r>
-                        <a:t>0</a:t>
-                      </a:r>
-                    </a:p>
-                  </a:txBody>
-                  <a:tcPr/>
-                </a:tc>
-                <a:tc>
-                  <a:txBody>
-                    <a:bodyPr/>
-                    <a:lstStyle/>
-                    <a:p>
-                      <a:r>
-                        <a:t>0</a:t>
                       </a:r>
                     </a:p>
                   </a:txBody>
@@ -5271,19 +5271,19 @@
                     <a:lstStyle/>
                     <a:p>
                       <a:r>
-                        <a:t>31</a:t>
-                      </a:r>
-                    </a:p>
-                  </a:txBody>
-                  <a:tcPr/>
-                </a:tc>
-                <a:tc>
-                  <a:txBody>
-                    <a:bodyPr/>
-                    <a:lstStyle/>
-                    <a:p>
-                      <a:r>
-                        <a:t>8</a:t>
+                        <a:t>58</a:t>
+                      </a:r>
+                    </a:p>
+                  </a:txBody>
+                  <a:tcPr/>
+                </a:tc>
+                <a:tc>
+                  <a:txBody>
+                    <a:bodyPr/>
+                    <a:lstStyle/>
+                    <a:p>
+                      <a:r>
+                        <a:t>18</a:t>
                       </a:r>
                     </a:p>
                   </a:txBody>
@@ -5307,19 +5307,91 @@
                     <a:lstStyle/>
                     <a:p>
                       <a:r>
-                        <a:t>12</a:t>
-                      </a:r>
-                    </a:p>
-                  </a:txBody>
-                  <a:tcPr/>
-                </a:tc>
-                <a:tc>
-                  <a:txBody>
-                    <a:bodyPr/>
-                    <a:lstStyle/>
-                    <a:p>
-                      <a:r>
-                        <a:t>0</a:t>
+                        <a:t>26</a:t>
+                      </a:r>
+                    </a:p>
+                  </a:txBody>
+                  <a:tcPr/>
+                </a:tc>
+                <a:tc>
+                  <a:txBody>
+                    <a:bodyPr/>
+                    <a:lstStyle/>
+                    <a:p>
+                      <a:r>
+                        <a:t>0</a:t>
+                      </a:r>
+                    </a:p>
+                  </a:txBody>
+                  <a:tcPr/>
+                </a:tc>
+                <a:tc>
+                  <a:txBody>
+                    <a:bodyPr/>
+                    <a:lstStyle/>
+                    <a:p>
+                      <a:r>
+                        <a:t>0</a:t>
+                      </a:r>
+                    </a:p>
+                  </a:txBody>
+                  <a:tcPr/>
+                </a:tc>
+                <a:tc>
+                  <a:txBody>
+                    <a:bodyPr/>
+                    <a:lstStyle/>
+                    <a:p>
+                      <a:r>
+                        <a:t>5</a:t>
+                      </a:r>
+                    </a:p>
+                  </a:txBody>
+                  <a:tcPr/>
+                </a:tc>
+                <a:tc>
+                  <a:txBody>
+                    <a:bodyPr/>
+                    <a:lstStyle/>
+                    <a:p>
+                      <a:r>
+                        <a:t>77</a:t>
+                      </a:r>
+                    </a:p>
+                  </a:txBody>
+                  <a:tcPr/>
+                </a:tc>
+                <a:tc>
+                  <a:txBody>
+                    <a:bodyPr/>
+                    <a:lstStyle/>
+                    <a:p>
+                      <a:r>
+                        <a:t>0</a:t>
+                      </a:r>
+                    </a:p>
+                  </a:txBody>
+                  <a:tcPr/>
+                </a:tc>
+                <a:tc>
+                  <a:txBody>
+                    <a:bodyPr/>
+                    <a:lstStyle/>
+                    <a:p>
+                      <a:r>
+                        <a:t>15</a:t>
+                      </a:r>
+                    </a:p>
+                  </a:txBody>
+                  <a:tcPr/>
+                </a:tc>
+                <a:tc>
+                  <a:txBody>
+                    <a:bodyPr/>
+                    <a:lstStyle/>
+                    <a:p>
+                      <a:r>
+                        <a:t>2</a:t>
                       </a:r>
                     </a:p>
                   </a:txBody>
@@ -5355,67 +5427,7 @@
                     <a:lstStyle/>
                     <a:p>
                       <a:r>
-                        <a:t>48</a:t>
-                      </a:r>
-                    </a:p>
-                  </a:txBody>
-                  <a:tcPr/>
-                </a:tc>
-                <a:tc>
-                  <a:txBody>
-                    <a:bodyPr/>
-                    <a:lstStyle/>
-                    <a:p>
-                      <a:r>
-                        <a:t>0</a:t>
-                      </a:r>
-                    </a:p>
-                  </a:txBody>
-                  <a:tcPr/>
-                </a:tc>
-                <a:tc>
-                  <a:txBody>
-                    <a:bodyPr/>
-                    <a:lstStyle/>
-                    <a:p>
-                      <a:r>
-                        <a:t>10</a:t>
-                      </a:r>
-                    </a:p>
-                  </a:txBody>
-                  <a:tcPr/>
-                </a:tc>
-                <a:tc>
-                  <a:txBody>
-                    <a:bodyPr/>
-                    <a:lstStyle/>
-                    <a:p>
-                      <a:r>
-                        <a:t>3</a:t>
-                      </a:r>
-                    </a:p>
-                  </a:txBody>
-                  <a:tcPr/>
-                </a:tc>
-                <a:tc>
-                  <a:txBody>
-                    <a:bodyPr/>
-                    <a:lstStyle/>
-                    <a:p>
-                      <a:r>
-                        <a:t>0</a:t>
-                      </a:r>
-                    </a:p>
-                  </a:txBody>
-                  <a:tcPr/>
-                </a:tc>
-                <a:tc>
-                  <a:txBody>
-                    <a:bodyPr/>
-                    <a:lstStyle/>
-                    <a:p>
-                      <a:r>
-                        <a:t>1</a:t>
+                        <a:t>5</a:t>
                       </a:r>
                     </a:p>
                   </a:txBody>
@@ -5439,19 +5451,7 @@
                     <a:lstStyle/>
                     <a:p>
                       <a:r>
-                        <a:t>2</a:t>
-                      </a:r>
-                    </a:p>
-                  </a:txBody>
-                  <a:tcPr/>
-                </a:tc>
-                <a:tc>
-                  <a:txBody>
-                    <a:bodyPr/>
-                    <a:lstStyle/>
-                    <a:p>
-                      <a:r>
-                        <a:t>3073</a:t>
+                        <a:t>2982</a:t>
                       </a:r>
                     </a:p>
                   </a:txBody>
@@ -5942,79 +5942,79 @@
                     <a:lstStyle/>
                     <a:p>
                       <a:r>
-                        <a:t>2</a:t>
-                      </a:r>
-                    </a:p>
-                  </a:txBody>
-                  <a:tcPr/>
-                </a:tc>
-                <a:tc>
-                  <a:txBody>
-                    <a:bodyPr/>
-                    <a:lstStyle/>
-                    <a:p>
-                      <a:r>
-                        <a:t>0</a:t>
-                      </a:r>
-                    </a:p>
-                  </a:txBody>
-                  <a:tcPr/>
-                </a:tc>
-                <a:tc>
-                  <a:txBody>
-                    <a:bodyPr/>
-                    <a:lstStyle/>
-                    <a:p>
-                      <a:r>
-                        <a:t>0</a:t>
-                      </a:r>
-                    </a:p>
-                  </a:txBody>
-                  <a:tcPr/>
-                </a:tc>
-                <a:tc>
-                  <a:txBody>
-                    <a:bodyPr/>
-                    <a:lstStyle/>
-                    <a:p>
-                      <a:r>
-                        <a:t>0</a:t>
-                      </a:r>
-                    </a:p>
-                  </a:txBody>
-                  <a:tcPr/>
-                </a:tc>
-                <a:tc>
-                  <a:txBody>
-                    <a:bodyPr/>
-                    <a:lstStyle/>
-                    <a:p>
-                      <a:r>
-                        <a:t>0</a:t>
-                      </a:r>
-                    </a:p>
-                  </a:txBody>
-                  <a:tcPr/>
-                </a:tc>
-                <a:tc>
-                  <a:txBody>
-                    <a:bodyPr/>
-                    <a:lstStyle/>
-                    <a:p>
-                      <a:r>
-                        <a:t>0</a:t>
-                      </a:r>
-                    </a:p>
-                  </a:txBody>
-                  <a:tcPr/>
-                </a:tc>
-                <a:tc>
-                  <a:txBody>
-                    <a:bodyPr/>
-                    <a:lstStyle/>
-                    <a:p>
-                      <a:r>
-                        <a:t>284</a:t>
+                        <a:t>4</a:t>
+                      </a:r>
+                    </a:p>
+                  </a:txBody>
+                  <a:tcPr/>
+                </a:tc>
+                <a:tc>
+                  <a:txBody>
+                    <a:bodyPr/>
+                    <a:lstStyle/>
+                    <a:p>
+                      <a:r>
+                        <a:t>0</a:t>
+                      </a:r>
+                    </a:p>
+                  </a:txBody>
+                  <a:tcPr/>
+                </a:tc>
+                <a:tc>
+                  <a:txBody>
+                    <a:bodyPr/>
+                    <a:lstStyle/>
+                    <a:p>
+                      <a:r>
+                        <a:t>0</a:t>
+                      </a:r>
+                    </a:p>
+                  </a:txBody>
+                  <a:tcPr/>
+                </a:tc>
+                <a:tc>
+                  <a:txBody>
+                    <a:bodyPr/>
+                    <a:lstStyle/>
+                    <a:p>
+                      <a:r>
+                        <a:t>0</a:t>
+                      </a:r>
+                    </a:p>
+                  </a:txBody>
+                  <a:tcPr/>
+                </a:tc>
+                <a:tc>
+                  <a:txBody>
+                    <a:bodyPr/>
+                    <a:lstStyle/>
+                    <a:p>
+                      <a:r>
+                        <a:t>0</a:t>
+                      </a:r>
+                    </a:p>
+                  </a:txBody>
+                  <a:tcPr/>
+                </a:tc>
+                <a:tc>
+                  <a:txBody>
+                    <a:bodyPr/>
+                    <a:lstStyle/>
+                    <a:p>
+                      <a:r>
+                        <a:t>0</a:t>
+                      </a:r>
+                    </a:p>
+                  </a:txBody>
+                  <a:tcPr/>
+                </a:tc>
+                <a:tc>
+                  <a:txBody>
+                    <a:bodyPr/>
+                    <a:lstStyle/>
+                    <a:p>
+                      <a:r>
+                        <a:t>282</a:t>
                       </a:r>
                     </a:p>
                   </a:txBody>
@@ -6402,79 +6402,79 @@
                     <a:lstStyle/>
                     <a:p>
                       <a:r>
-                        <a:t>2</a:t>
-                      </a:r>
-                    </a:p>
-                  </a:txBody>
-                  <a:tcPr/>
-                </a:tc>
-                <a:tc>
-                  <a:txBody>
-                    <a:bodyPr/>
-                    <a:lstStyle/>
-                    <a:p>
-                      <a:r>
-                        <a:t>0</a:t>
-                      </a:r>
-                    </a:p>
-                  </a:txBody>
-                  <a:tcPr/>
-                </a:tc>
-                <a:tc>
-                  <a:txBody>
-                    <a:bodyPr/>
-                    <a:lstStyle/>
-                    <a:p>
-                      <a:r>
-                        <a:t>0</a:t>
-                      </a:r>
-                    </a:p>
-                  </a:txBody>
-                  <a:tcPr/>
-                </a:tc>
-                <a:tc>
-                  <a:txBody>
-                    <a:bodyPr/>
-                    <a:lstStyle/>
-                    <a:p>
-                      <a:r>
-                        <a:t>0</a:t>
-                      </a:r>
-                    </a:p>
-                  </a:txBody>
-                  <a:tcPr/>
-                </a:tc>
-                <a:tc>
-                  <a:txBody>
-                    <a:bodyPr/>
-                    <a:lstStyle/>
-                    <a:p>
-                      <a:r>
-                        <a:t>0</a:t>
-                      </a:r>
-                    </a:p>
-                  </a:txBody>
-                  <a:tcPr/>
-                </a:tc>
-                <a:tc>
-                  <a:txBody>
-                    <a:bodyPr/>
-                    <a:lstStyle/>
-                    <a:p>
-                      <a:r>
-                        <a:t>0</a:t>
-                      </a:r>
-                    </a:p>
-                  </a:txBody>
-                  <a:tcPr/>
-                </a:tc>
-                <a:tc>
-                  <a:txBody>
-                    <a:bodyPr/>
-                    <a:lstStyle/>
-                    <a:p>
-                      <a:r>
-                        <a:t>3190</a:t>
+                        <a:t>4</a:t>
+                      </a:r>
+                    </a:p>
+                  </a:txBody>
+                  <a:tcPr/>
+                </a:tc>
+                <a:tc>
+                  <a:txBody>
+                    <a:bodyPr/>
+                    <a:lstStyle/>
+                    <a:p>
+                      <a:r>
+                        <a:t>0</a:t>
+                      </a:r>
+                    </a:p>
+                  </a:txBody>
+                  <a:tcPr/>
+                </a:tc>
+                <a:tc>
+                  <a:txBody>
+                    <a:bodyPr/>
+                    <a:lstStyle/>
+                    <a:p>
+                      <a:r>
+                        <a:t>0</a:t>
+                      </a:r>
+                    </a:p>
+                  </a:txBody>
+                  <a:tcPr/>
+                </a:tc>
+                <a:tc>
+                  <a:txBody>
+                    <a:bodyPr/>
+                    <a:lstStyle/>
+                    <a:p>
+                      <a:r>
+                        <a:t>0</a:t>
+                      </a:r>
+                    </a:p>
+                  </a:txBody>
+                  <a:tcPr/>
+                </a:tc>
+                <a:tc>
+                  <a:txBody>
+                    <a:bodyPr/>
+                    <a:lstStyle/>
+                    <a:p>
+                      <a:r>
+                        <a:t>0</a:t>
+                      </a:r>
+                    </a:p>
+                  </a:txBody>
+                  <a:tcPr/>
+                </a:tc>
+                <a:tc>
+                  <a:txBody>
+                    <a:bodyPr/>
+                    <a:lstStyle/>
+                    <a:p>
+                      <a:r>
+                        <a:t>0</a:t>
+                      </a:r>
+                    </a:p>
+                  </a:txBody>
+                  <a:tcPr/>
+                </a:tc>
+                <a:tc>
+                  <a:txBody>
+                    <a:bodyPr/>
+                    <a:lstStyle/>
+                    <a:p>
+                      <a:r>
+                        <a:t>3188</a:t>
                       </a:r>
                     </a:p>
                   </a:txBody>

</xml_diff>